<commit_message>
Update GUI and slight change to simulation model
</commit_message>
<xml_diff>
--- a/sim-design.pptx
+++ b/sim-design.pptx
@@ -3185,7 +3185,7 @@
           <a:p>
             <a:fld id="{DDD63927-7628-4D20-9DA4-4FD0E58BD032}" type="datetimeFigureOut">
               <a:rPr lang="en-GB" smtClean="0"/>
-              <a:t>13/06/2022</a:t>
+              <a:t>15/06/2022</a:t>
             </a:fld>
             <a:endParaRPr lang="en-GB"/>
           </a:p>
@@ -3355,7 +3355,7 @@
           <a:p>
             <a:fld id="{DDD63927-7628-4D20-9DA4-4FD0E58BD032}" type="datetimeFigureOut">
               <a:rPr lang="en-GB" smtClean="0"/>
-              <a:t>13/06/2022</a:t>
+              <a:t>15/06/2022</a:t>
             </a:fld>
             <a:endParaRPr lang="en-GB"/>
           </a:p>
@@ -3535,7 +3535,7 @@
           <a:p>
             <a:fld id="{DDD63927-7628-4D20-9DA4-4FD0E58BD032}" type="datetimeFigureOut">
               <a:rPr lang="en-GB" smtClean="0"/>
-              <a:t>13/06/2022</a:t>
+              <a:t>15/06/2022</a:t>
             </a:fld>
             <a:endParaRPr lang="en-GB"/>
           </a:p>
@@ -3705,7 +3705,7 @@
           <a:p>
             <a:fld id="{DDD63927-7628-4D20-9DA4-4FD0E58BD032}" type="datetimeFigureOut">
               <a:rPr lang="en-GB" smtClean="0"/>
-              <a:t>13/06/2022</a:t>
+              <a:t>15/06/2022</a:t>
             </a:fld>
             <a:endParaRPr lang="en-GB"/>
           </a:p>
@@ -3951,7 +3951,7 @@
           <a:p>
             <a:fld id="{DDD63927-7628-4D20-9DA4-4FD0E58BD032}" type="datetimeFigureOut">
               <a:rPr lang="en-GB" smtClean="0"/>
-              <a:t>13/06/2022</a:t>
+              <a:t>15/06/2022</a:t>
             </a:fld>
             <a:endParaRPr lang="en-GB"/>
           </a:p>
@@ -4183,7 +4183,7 @@
           <a:p>
             <a:fld id="{DDD63927-7628-4D20-9DA4-4FD0E58BD032}" type="datetimeFigureOut">
               <a:rPr lang="en-GB" smtClean="0"/>
-              <a:t>13/06/2022</a:t>
+              <a:t>15/06/2022</a:t>
             </a:fld>
             <a:endParaRPr lang="en-GB"/>
           </a:p>
@@ -4550,7 +4550,7 @@
           <a:p>
             <a:fld id="{DDD63927-7628-4D20-9DA4-4FD0E58BD032}" type="datetimeFigureOut">
               <a:rPr lang="en-GB" smtClean="0"/>
-              <a:t>13/06/2022</a:t>
+              <a:t>15/06/2022</a:t>
             </a:fld>
             <a:endParaRPr lang="en-GB"/>
           </a:p>
@@ -4668,7 +4668,7 @@
           <a:p>
             <a:fld id="{DDD63927-7628-4D20-9DA4-4FD0E58BD032}" type="datetimeFigureOut">
               <a:rPr lang="en-GB" smtClean="0"/>
-              <a:t>13/06/2022</a:t>
+              <a:t>15/06/2022</a:t>
             </a:fld>
             <a:endParaRPr lang="en-GB"/>
           </a:p>
@@ -4763,7 +4763,7 @@
           <a:p>
             <a:fld id="{DDD63927-7628-4D20-9DA4-4FD0E58BD032}" type="datetimeFigureOut">
               <a:rPr lang="en-GB" smtClean="0"/>
-              <a:t>13/06/2022</a:t>
+              <a:t>15/06/2022</a:t>
             </a:fld>
             <a:endParaRPr lang="en-GB"/>
           </a:p>
@@ -5040,7 +5040,7 @@
           <a:p>
             <a:fld id="{DDD63927-7628-4D20-9DA4-4FD0E58BD032}" type="datetimeFigureOut">
               <a:rPr lang="en-GB" smtClean="0"/>
-              <a:t>13/06/2022</a:t>
+              <a:t>15/06/2022</a:t>
             </a:fld>
             <a:endParaRPr lang="en-GB"/>
           </a:p>
@@ -5297,7 +5297,7 @@
           <a:p>
             <a:fld id="{DDD63927-7628-4D20-9DA4-4FD0E58BD032}" type="datetimeFigureOut">
               <a:rPr lang="en-GB" smtClean="0"/>
-              <a:t>13/06/2022</a:t>
+              <a:t>15/06/2022</a:t>
             </a:fld>
             <a:endParaRPr lang="en-GB"/>
           </a:p>
@@ -5510,7 +5510,7 @@
           <a:p>
             <a:fld id="{DDD63927-7628-4D20-9DA4-4FD0E58BD032}" type="datetimeFigureOut">
               <a:rPr lang="en-GB" smtClean="0"/>
-              <a:t>13/06/2022</a:t>
+              <a:t>15/06/2022</a:t>
             </a:fld>
             <a:endParaRPr lang="en-GB"/>
           </a:p>
@@ -10758,7 +10758,7 @@
         <p:spPr>
           <a:xfrm>
             <a:off x="19527" y="2782669"/>
-            <a:ext cx="3349547" cy="646331"/>
+            <a:ext cx="3349547" cy="923330"/>
           </a:xfrm>
           <a:prstGeom prst="rect">
             <a:avLst/>
@@ -10776,8 +10776,12 @@
               <a:buChar char="•"/>
             </a:pPr>
             <a:r>
+              <a:rPr lang="en-GB"/>
+              <a:t>Kill &lt;=10 </a:t>
+            </a:r>
+            <a:r>
               <a:rPr lang="en-GB" dirty="0"/>
-              <a:t>Kill 10 random unlucky victim</a:t>
+              <a:t>random unlucky victim</a:t>
             </a:r>
           </a:p>
           <a:p>

</xml_diff>